<commit_message>
cambios al tablero de control 1.3
</commit_message>
<xml_diff>
--- a/trunk/docs/Entregables/Tablero de control/GRUPO 5508 - SAFE - Tablero de control integral - UTN - v1.3.pptx
+++ b/trunk/docs/Entregables/Tablero de control/GRUPO 5508 - SAFE - Tablero de control integral - UTN - v1.3.pptx
@@ -6264,7 +6264,7 @@
                 <a:latin typeface="Arial" panose="020B0604020202020204" pitchFamily="34" charset="0"/>
                 <a:cs typeface="Arial" panose="020B0604020202020204" pitchFamily="34" charset="0"/>
               </a:rPr>
-              <a:t>Se aprobaron documentos de casos de uso de negocio. (Fecha fin: 09-09-2016).</a:t>
+              <a:t>Se aprobaron los documentos de casos de uso de negocio. (Fecha fin: 09-09-2016).</a:t>
             </a:r>
           </a:p>
           <a:p>
@@ -6283,7 +6283,7 @@
                 <a:latin typeface="Arial" panose="020B0604020202020204" pitchFamily="34" charset="0"/>
                 <a:cs typeface="Arial" panose="020B0604020202020204" pitchFamily="34" charset="0"/>
               </a:rPr>
-              <a:t>Se aprobó documentación de Arquitectura ( Fecha fin: 16-09-2016).</a:t>
+              <a:t>Se aprobó el documentación de Arquitectura ( Fecha fin: 16-09-2016).</a:t>
             </a:r>
           </a:p>
           <a:p>

</xml_diff>

<commit_message>
correccion tablero, y casos de usos
</commit_message>
<xml_diff>
--- a/trunk/docs/Entregables/Tablero de control/GRUPO 5508 - SAFE - Tablero de control integral - UTN - v1.3.pptx
+++ b/trunk/docs/Entregables/Tablero de control/GRUPO 5508 - SAFE - Tablero de control integral - UTN - v1.3.pptx
@@ -6283,7 +6283,21 @@
                 <a:latin typeface="Arial" panose="020B0604020202020204" pitchFamily="34" charset="0"/>
                 <a:cs typeface="Arial" panose="020B0604020202020204" pitchFamily="34" charset="0"/>
               </a:rPr>
-              <a:t>Se aprobó el documentación de Arquitectura ( Fecha fin: 16-09-2016).</a:t>
+              <a:t>Se aprobó </a:t>
+            </a:r>
+            <a:r>
+              <a:rPr lang="es-AR" sz="1000">
+                <a:latin typeface="Arial" panose="020B0604020202020204" pitchFamily="34" charset="0"/>
+                <a:cs typeface="Arial" panose="020B0604020202020204" pitchFamily="34" charset="0"/>
+              </a:rPr>
+              <a:t>el documento </a:t>
+            </a:r>
+            <a:r>
+              <a:rPr lang="es-AR" sz="1000" dirty="0">
+                <a:latin typeface="Arial" panose="020B0604020202020204" pitchFamily="34" charset="0"/>
+                <a:cs typeface="Arial" panose="020B0604020202020204" pitchFamily="34" charset="0"/>
+              </a:rPr>
+              <a:t>de Arquitectura ( Fecha fin: 16-09-2016).</a:t>
             </a:r>
           </a:p>
           <a:p>

</xml_diff>